<commit_message>
Final tuning and website style.
</commit_message>
<xml_diff>
--- a/docs/Controller.pptx
+++ b/docs/Controller.pptx
@@ -104,6 +104,11 @@
       </a:defRPr>
     </a:lvl9pPr>
   </p:defaultTextStyle>
+  <p:extLst>
+    <p:ext uri="{EFAFB233-063F-42B5-8137-9DF3F51BA10A}">
+      <p15:sldGuideLst xmlns:p15="http://schemas.microsoft.com/office/powerpoint/2012/main"/>
+    </p:ext>
+  </p:extLst>
 </p:presentation>
 </file>
 
@@ -3375,7 +3380,7 @@
           </a:prstGeom>
           <a:ln w="38100">
             <a:solidFill>
-              <a:schemeClr val="accent3"/>
+              <a:schemeClr val="accent4"/>
             </a:solidFill>
           </a:ln>
         </p:spPr>
@@ -3868,13 +3873,16 @@
               </a:ext>
             </a:extLst>
           </p:cNvPr>
-          <p:cNvCxnSpPr/>
+          <p:cNvCxnSpPr>
+            <a:cxnSpLocks/>
+            <a:endCxn id="34" idx="1"/>
+          </p:cNvCxnSpPr>
           <p:nvPr/>
         </p:nvCxnSpPr>
         <p:spPr>
-          <a:xfrm flipV="1">
-            <a:off x="6710363" y="2843213"/>
-            <a:ext cx="1647825" cy="364331"/>
+          <a:xfrm>
+            <a:off x="6710363" y="3207545"/>
+            <a:ext cx="1967806" cy="825995"/>
           </a:xfrm>
           <a:prstGeom prst="line">
             <a:avLst/>
@@ -3914,7 +3922,7 @@
         </p:nvSpPr>
         <p:spPr>
           <a:xfrm>
-            <a:off x="8421293" y="2381548"/>
+            <a:off x="8678169" y="3571875"/>
             <a:ext cx="1027508" cy="923330"/>
           </a:xfrm>
           <a:prstGeom prst="rect">
@@ -4448,6 +4456,88 @@
                 <a:cs typeface="Euphemia" panose="020F0502020204030204" pitchFamily="34" charset="0"/>
               </a:rPr>
               <a:t>Rotate About XY-Plane</a:t>
+            </a:r>
+          </a:p>
+        </p:txBody>
+      </p:sp>
+      <p:cxnSp>
+        <p:nvCxnSpPr>
+          <p:cNvPr id="58" name="Straight Connector 57">
+            <a:extLst>
+              <a:ext uri="{FF2B5EF4-FFF2-40B4-BE49-F238E27FC236}">
+                <a16:creationId xmlns:a16="http://schemas.microsoft.com/office/drawing/2014/main" id="{8637AF4F-252C-5343-B16D-8514AD2CCA24}"/>
+              </a:ext>
+            </a:extLst>
+          </p:cNvPr>
+          <p:cNvCxnSpPr>
+            <a:cxnSpLocks/>
+          </p:cNvCxnSpPr>
+          <p:nvPr/>
+        </p:nvCxnSpPr>
+        <p:spPr>
+          <a:xfrm flipV="1">
+            <a:off x="7340723" y="2319465"/>
+            <a:ext cx="1508057" cy="554448"/>
+          </a:xfrm>
+          <a:prstGeom prst="line">
+            <a:avLst/>
+          </a:prstGeom>
+          <a:ln w="38100">
+            <a:solidFill>
+              <a:schemeClr val="accent6"/>
+            </a:solidFill>
+          </a:ln>
+        </p:spPr>
+        <p:style>
+          <a:lnRef idx="2">
+            <a:schemeClr val="accent2"/>
+          </a:lnRef>
+          <a:fillRef idx="0">
+            <a:schemeClr val="accent2"/>
+          </a:fillRef>
+          <a:effectRef idx="1">
+            <a:schemeClr val="accent2"/>
+          </a:effectRef>
+          <a:fontRef idx="minor">
+            <a:schemeClr val="tx1"/>
+          </a:fontRef>
+        </p:style>
+      </p:cxnSp>
+      <p:sp>
+        <p:nvSpPr>
+          <p:cNvPr id="59" name="TextBox 58">
+            <a:extLst>
+              <a:ext uri="{FF2B5EF4-FFF2-40B4-BE49-F238E27FC236}">
+                <a16:creationId xmlns:a16="http://schemas.microsoft.com/office/drawing/2014/main" id="{3772B8DF-2FE1-3A4C-9375-97C1F6184011}"/>
+              </a:ext>
+            </a:extLst>
+          </p:cNvPr>
+          <p:cNvSpPr txBox="1"/>
+          <p:nvPr/>
+        </p:nvSpPr>
+        <p:spPr>
+          <a:xfrm>
+            <a:off x="8848780" y="1950132"/>
+            <a:ext cx="1550437" cy="646331"/>
+          </a:xfrm>
+          <a:prstGeom prst="rect">
+            <a:avLst/>
+          </a:prstGeom>
+          <a:noFill/>
+        </p:spPr>
+        <p:txBody>
+          <a:bodyPr wrap="square" rtlCol="0">
+            <a:spAutoFit/>
+          </a:bodyPr>
+          <a:lstStyle/>
+          <a:p>
+            <a:pPr algn="ctr"/>
+            <a:r>
+              <a:rPr lang="en-US" dirty="0">
+                <a:latin typeface="Euphemia" panose="020F0502020204030204" pitchFamily="34" charset="0"/>
+                <a:cs typeface="Euphemia" panose="020F0502020204030204" pitchFamily="34" charset="0"/>
+              </a:rPr>
+              <a:t>Toggle 3D Mode</a:t>
             </a:r>
           </a:p>
         </p:txBody>

</xml_diff>